<commit_message>
Update files during presentation
</commit_message>
<xml_diff>
--- a/Day3.pptx
+++ b/Day3.pptx
@@ -14,6 +14,8 @@
     <p:sldId id="262" r:id="rId8"/>
     <p:sldId id="264" r:id="rId9"/>
     <p:sldId id="265" r:id="rId10"/>
+    <p:sldId id="267" r:id="rId11"/>
+    <p:sldId id="268" r:id="rId12"/>
   </p:sldIdLst>
   <p:sldSz cx="12192000" cy="6858000"/>
   <p:notesSz cx="6858000" cy="9144000"/>
@@ -3093,6 +3095,256 @@
 </p:sld>
 </file>
 
+<file path=ppt/slides/slide10.xml><?xml version="1.0" encoding="utf-8"?>
+<p:sld xmlns:a="http://schemas.openxmlformats.org/drawingml/2006/main" xmlns:r="http://schemas.openxmlformats.org/officeDocument/2006/relationships" xmlns:p="http://schemas.openxmlformats.org/presentationml/2006/main">
+  <p:cSld>
+    <p:spTree>
+      <p:nvGrpSpPr>
+        <p:cNvPr id="1" name=""/>
+        <p:cNvGrpSpPr/>
+        <p:nvPr/>
+      </p:nvGrpSpPr>
+      <p:grpSpPr>
+        <a:xfrm>
+          <a:off x="0" y="0"/>
+          <a:ext cx="0" cy="0"/>
+          <a:chOff x="0" y="0"/>
+          <a:chExt cx="0" cy="0"/>
+        </a:xfrm>
+      </p:grpSpPr>
+      <p:pic>
+        <p:nvPicPr>
+          <p:cNvPr id="2" name="Picture 1"/>
+          <p:cNvPicPr>
+            <a:picLocks noChangeAspect="1"/>
+          </p:cNvPicPr>
+          <p:nvPr/>
+        </p:nvPicPr>
+        <p:blipFill>
+          <a:blip r:embed="rId2"/>
+          <a:stretch>
+            <a:fillRect/>
+          </a:stretch>
+        </p:blipFill>
+        <p:spPr>
+          <a:xfrm>
+            <a:off x="728661" y="4375240"/>
+            <a:ext cx="3595690" cy="1720759"/>
+          </a:xfrm>
+          <a:prstGeom prst="rect">
+            <a:avLst/>
+          </a:prstGeom>
+        </p:spPr>
+      </p:pic>
+      <p:sp>
+        <p:nvSpPr>
+          <p:cNvPr id="3" name="Rectangle 2"/>
+          <p:cNvSpPr/>
+          <p:nvPr/>
+        </p:nvSpPr>
+        <p:spPr>
+          <a:xfrm>
+            <a:off x="4804080" y="4705170"/>
+            <a:ext cx="3245825" cy="1200329"/>
+          </a:xfrm>
+          <a:prstGeom prst="rect">
+            <a:avLst/>
+          </a:prstGeom>
+        </p:spPr>
+        <p:txBody>
+          <a:bodyPr wrap="none">
+            <a:spAutoFit/>
+          </a:bodyPr>
+          <a:lstStyle/>
+          <a:p>
+            <a:r>
+              <a:rPr lang="en-US" sz="3600" dirty="0" smtClean="0">
+                <a:hlinkClick r:id="rId3"/>
+              </a:rPr>
+              <a:t>https://keras.io/</a:t>
+            </a:r>
+            <a:endParaRPr lang="en-US" sz="3600" dirty="0" smtClean="0"/>
+          </a:p>
+          <a:p>
+            <a:endParaRPr lang="en-US" sz="3600" dirty="0"/>
+          </a:p>
+        </p:txBody>
+      </p:sp>
+      <p:pic>
+        <p:nvPicPr>
+          <p:cNvPr id="4" name="Picture 3"/>
+          <p:cNvPicPr>
+            <a:picLocks noChangeAspect="1"/>
+          </p:cNvPicPr>
+          <p:nvPr/>
+        </p:nvPicPr>
+        <p:blipFill>
+          <a:blip r:embed="rId4" cstate="print">
+            <a:extLst>
+              <a:ext uri="{28A0092B-C50C-407E-A947-70E740481C1C}">
+                <a14:useLocalDpi xmlns:a14="http://schemas.microsoft.com/office/drawing/2010/main" val="0"/>
+              </a:ext>
+            </a:extLst>
+          </a:blip>
+          <a:stretch>
+            <a:fillRect/>
+          </a:stretch>
+        </p:blipFill>
+        <p:spPr>
+          <a:xfrm>
+            <a:off x="2867025" y="382821"/>
+            <a:ext cx="6054280" cy="2612462"/>
+          </a:xfrm>
+          <a:prstGeom prst="rect">
+            <a:avLst/>
+          </a:prstGeom>
+        </p:spPr>
+      </p:pic>
+    </p:spTree>
+    <p:extLst>
+      <p:ext uri="{BB962C8B-B14F-4D97-AF65-F5344CB8AC3E}">
+        <p14:creationId xmlns:p14="http://schemas.microsoft.com/office/powerpoint/2010/main" val="2075100224"/>
+      </p:ext>
+    </p:extLst>
+  </p:cSld>
+  <p:clrMapOvr>
+    <a:masterClrMapping/>
+  </p:clrMapOvr>
+  <p:timing>
+    <p:tnLst>
+      <p:par>
+        <p:cTn id="1" dur="indefinite" restart="never" nodeType="tmRoot"/>
+      </p:par>
+    </p:tnLst>
+  </p:timing>
+</p:sld>
+</file>
+
+<file path=ppt/slides/slide11.xml><?xml version="1.0" encoding="utf-8"?>
+<p:sld xmlns:a="http://schemas.openxmlformats.org/drawingml/2006/main" xmlns:r="http://schemas.openxmlformats.org/officeDocument/2006/relationships" xmlns:p="http://schemas.openxmlformats.org/presentationml/2006/main">
+  <p:cSld>
+    <p:spTree>
+      <p:nvGrpSpPr>
+        <p:cNvPr id="1" name=""/>
+        <p:cNvGrpSpPr/>
+        <p:nvPr/>
+      </p:nvGrpSpPr>
+      <p:grpSpPr>
+        <a:xfrm>
+          <a:off x="0" y="0"/>
+          <a:ext cx="0" cy="0"/>
+          <a:chOff x="0" y="0"/>
+          <a:chExt cx="0" cy="0"/>
+        </a:xfrm>
+      </p:grpSpPr>
+      <p:sp>
+        <p:nvSpPr>
+          <p:cNvPr id="2" name="Rectangle 1"/>
+          <p:cNvSpPr/>
+          <p:nvPr/>
+        </p:nvSpPr>
+        <p:spPr>
+          <a:xfrm>
+            <a:off x="1400175" y="2736850"/>
+            <a:ext cx="5267326" cy="1200329"/>
+          </a:xfrm>
+          <a:prstGeom prst="rect">
+            <a:avLst/>
+          </a:prstGeom>
+        </p:spPr>
+        <p:txBody>
+          <a:bodyPr wrap="square">
+            <a:spAutoFit/>
+          </a:bodyPr>
+          <a:lstStyle/>
+          <a:p>
+            <a:r>
+              <a:rPr lang="en-US" dirty="0" smtClean="0">
+                <a:hlinkClick r:id="rId2"/>
+              </a:rPr>
+              <a:t>https://towardsdatascience.com/setup-an-environment-for-machine-learning-and-deep-learning-with-anaconda-in-windows-5d7134a3db10</a:t>
+            </a:r>
+            <a:endParaRPr lang="en-US" dirty="0" smtClean="0"/>
+          </a:p>
+          <a:p>
+            <a:endParaRPr lang="en-US" dirty="0"/>
+          </a:p>
+        </p:txBody>
+      </p:sp>
+      <p:pic>
+        <p:nvPicPr>
+          <p:cNvPr id="3" name="Picture 2"/>
+          <p:cNvPicPr>
+            <a:picLocks noChangeAspect="1"/>
+          </p:cNvPicPr>
+          <p:nvPr/>
+        </p:nvPicPr>
+        <p:blipFill>
+          <a:blip r:embed="rId3">
+            <a:extLst>
+              <a:ext uri="{28A0092B-C50C-407E-A947-70E740481C1C}">
+                <a14:useLocalDpi xmlns:a14="http://schemas.microsoft.com/office/drawing/2010/main" val="0"/>
+              </a:ext>
+            </a:extLst>
+          </a:blip>
+          <a:stretch>
+            <a:fillRect/>
+          </a:stretch>
+        </p:blipFill>
+        <p:spPr>
+          <a:xfrm>
+            <a:off x="6810376" y="2375842"/>
+            <a:ext cx="5105399" cy="3403599"/>
+          </a:xfrm>
+          <a:prstGeom prst="rect">
+            <a:avLst/>
+          </a:prstGeom>
+        </p:spPr>
+      </p:pic>
+      <p:pic>
+        <p:nvPicPr>
+          <p:cNvPr id="4" name="Picture 3"/>
+          <p:cNvPicPr>
+            <a:picLocks noChangeAspect="1"/>
+          </p:cNvPicPr>
+          <p:nvPr/>
+        </p:nvPicPr>
+        <p:blipFill>
+          <a:blip r:embed="rId4"/>
+          <a:stretch>
+            <a:fillRect/>
+          </a:stretch>
+        </p:blipFill>
+        <p:spPr>
+          <a:xfrm>
+            <a:off x="352425" y="60041"/>
+            <a:ext cx="8810625" cy="2360251"/>
+          </a:xfrm>
+          <a:prstGeom prst="rect">
+            <a:avLst/>
+          </a:prstGeom>
+        </p:spPr>
+      </p:pic>
+    </p:spTree>
+    <p:extLst>
+      <p:ext uri="{BB962C8B-B14F-4D97-AF65-F5344CB8AC3E}">
+        <p14:creationId xmlns:p14="http://schemas.microsoft.com/office/powerpoint/2010/main" val="4274008655"/>
+      </p:ext>
+    </p:extLst>
+  </p:cSld>
+  <p:clrMapOvr>
+    <a:masterClrMapping/>
+  </p:clrMapOvr>
+  <p:timing>
+    <p:tnLst>
+      <p:par>
+        <p:cTn id="1" dur="indefinite" restart="never" nodeType="tmRoot"/>
+      </p:par>
+    </p:tnLst>
+  </p:timing>
+</p:sld>
+</file>
+
 <file path=ppt/slides/slide2.xml><?xml version="1.0" encoding="utf-8"?>
 <p:sld xmlns:a="http://schemas.openxmlformats.org/drawingml/2006/main" xmlns:r="http://schemas.openxmlformats.org/officeDocument/2006/relationships" xmlns:p="http://schemas.openxmlformats.org/presentationml/2006/main">
   <p:cSld>
@@ -4076,6 +4328,13 @@
   <p:clrMapOvr>
     <a:masterClrMapping/>
   </p:clrMapOvr>
+  <p:timing>
+    <p:tnLst>
+      <p:par>
+        <p:cTn id="1" dur="indefinite" restart="never" nodeType="tmRoot"/>
+      </p:par>
+    </p:tnLst>
+  </p:timing>
 </p:sld>
 </file>
 

</xml_diff>